<commit_message>
Update Capstone Pres - Brody Hill.pptx
</commit_message>
<xml_diff>
--- a/Reports/Capstone Pres - Brody Hill.pptx
+++ b/Reports/Capstone Pres - Brody Hill.pptx
@@ -17819,14 +17819,65 @@
         </p:blipFill>
         <p:spPr>
           <a:xfrm>
-            <a:off x="1172584" y="1226372"/>
-            <a:ext cx="9810973" cy="5021168"/>
+            <a:off x="380662" y="766482"/>
+            <a:ext cx="11279067" cy="5836060"/>
           </a:xfrm>
           <a:prstGeom prst="rect">
             <a:avLst/>
           </a:prstGeom>
         </p:spPr>
       </p:pic>
+      <p:sp>
+        <p:nvSpPr>
+          <p:cNvPr id="3" name="Rectangle 2">
+            <a:extLst>
+              <a:ext uri="{FF2B5EF4-FFF2-40B4-BE49-F238E27FC236}">
+                <a16:creationId xmlns:a16="http://schemas.microsoft.com/office/drawing/2014/main" id="{1FE37726-621C-2B10-75C7-62DFC7DE18BB}"/>
+              </a:ext>
+            </a:extLst>
+          </p:cNvPr>
+          <p:cNvSpPr/>
+          <p:nvPr/>
+        </p:nvSpPr>
+        <p:spPr>
+          <a:xfrm>
+            <a:off x="7328647" y="2743200"/>
+            <a:ext cx="887506" cy="1788459"/>
+          </a:xfrm>
+          <a:prstGeom prst="rect">
+            <a:avLst/>
+          </a:prstGeom>
+          <a:solidFill>
+            <a:srgbClr val="FFFF00">
+              <a:alpha val="56952"/>
+            </a:srgbClr>
+          </a:solidFill>
+        </p:spPr>
+        <p:style>
+          <a:lnRef idx="2">
+            <a:schemeClr val="accent1">
+              <a:shade val="15000"/>
+            </a:schemeClr>
+          </a:lnRef>
+          <a:fillRef idx="1">
+            <a:schemeClr val="accent1"/>
+          </a:fillRef>
+          <a:effectRef idx="0">
+            <a:schemeClr val="accent1"/>
+          </a:effectRef>
+          <a:fontRef idx="minor">
+            <a:schemeClr val="lt1"/>
+          </a:fontRef>
+        </p:style>
+        <p:txBody>
+          <a:bodyPr rtlCol="0" anchor="ctr"/>
+          <a:lstStyle/>
+          <a:p>
+            <a:pPr algn="ctr"/>
+            <a:endParaRPr lang="en-US"/>
+          </a:p>
+        </p:txBody>
+      </p:sp>
     </p:spTree>
     <p:extLst>
       <p:ext uri="{BB962C8B-B14F-4D97-AF65-F5344CB8AC3E}">
@@ -17837,6 +17888,92 @@
   <p:clrMapOvr>
     <a:masterClrMapping/>
   </p:clrMapOvr>
+  <p:timing>
+    <p:tnLst>
+      <p:par>
+        <p:cTn id="1" dur="indefinite" restart="never" nodeType="tmRoot">
+          <p:childTnLst>
+            <p:seq concurrent="1" nextAc="seek">
+              <p:cTn id="2" dur="indefinite" nodeType="mainSeq">
+                <p:childTnLst>
+                  <p:par>
+                    <p:cTn id="3" fill="hold">
+                      <p:stCondLst>
+                        <p:cond delay="indefinite"/>
+                      </p:stCondLst>
+                      <p:childTnLst>
+                        <p:par>
+                          <p:cTn id="4" fill="hold">
+                            <p:stCondLst>
+                              <p:cond delay="0"/>
+                            </p:stCondLst>
+                            <p:childTnLst>
+                              <p:par>
+                                <p:cTn id="5" presetID="22" presetClass="entr" presetSubtype="4" fill="hold" grpId="0" nodeType="clickEffect">
+                                  <p:stCondLst>
+                                    <p:cond delay="0"/>
+                                  </p:stCondLst>
+                                  <p:childTnLst>
+                                    <p:set>
+                                      <p:cBhvr>
+                                        <p:cTn id="6" dur="1" fill="hold">
+                                          <p:stCondLst>
+                                            <p:cond delay="0"/>
+                                          </p:stCondLst>
+                                        </p:cTn>
+                                        <p:tgtEl>
+                                          <p:spTgt spid="3"/>
+                                        </p:tgtEl>
+                                        <p:attrNameLst>
+                                          <p:attrName>style.visibility</p:attrName>
+                                        </p:attrNameLst>
+                                      </p:cBhvr>
+                                      <p:to>
+                                        <p:strVal val="visible"/>
+                                      </p:to>
+                                    </p:set>
+                                    <p:animEffect transition="in" filter="wipe(down)">
+                                      <p:cBhvr>
+                                        <p:cTn id="7" dur="500"/>
+                                        <p:tgtEl>
+                                          <p:spTgt spid="3"/>
+                                        </p:tgtEl>
+                                      </p:cBhvr>
+                                    </p:animEffect>
+                                  </p:childTnLst>
+                                </p:cTn>
+                              </p:par>
+                            </p:childTnLst>
+                          </p:cTn>
+                        </p:par>
+                      </p:childTnLst>
+                    </p:cTn>
+                  </p:par>
+                </p:childTnLst>
+              </p:cTn>
+              <p:prevCondLst>
+                <p:cond evt="onPrev" delay="0">
+                  <p:tgtEl>
+                    <p:sldTgt/>
+                  </p:tgtEl>
+                </p:cond>
+              </p:prevCondLst>
+              <p:nextCondLst>
+                <p:cond evt="onNext" delay="0">
+                  <p:tgtEl>
+                    <p:sldTgt/>
+                  </p:tgtEl>
+                </p:cond>
+              </p:nextCondLst>
+            </p:seq>
+          </p:childTnLst>
+        </p:cTn>
+      </p:par>
+    </p:tnLst>
+    <p:bldLst>
+      <p:bldP spid="3" grpId="0" animBg="1"/>
+    </p:bldLst>
+  </p:timing>
 </p:sld>
 </file>
 

</xml_diff>